<commit_message>
Added overview questionnaire to the mentorship
</commit_message>
<xml_diff>
--- a/Designs/Presentation1.pptx
+++ b/Designs/Presentation1.pptx
@@ -7,6 +7,7 @@
   <p:sldIdLst>
     <p:sldId id="256" r:id="rId2"/>
     <p:sldId id="257" r:id="rId3"/>
+    <p:sldId id="258" r:id="rId4"/>
   </p:sldIdLst>
   <p:sldSz cx="12192000" cy="6858000"/>
   <p:notesSz cx="6858000" cy="9144000"/>
@@ -105,6 +106,11 @@
       </a:defRPr>
     </a:lvl9pPr>
   </p:defaultTextStyle>
+  <p:extLst>
+    <p:ext uri="{EFAFB233-063F-42B5-8137-9DF3F51BA10A}">
+      <p15:sldGuideLst xmlns:p15="http://schemas.microsoft.com/office/powerpoint/2012/main"/>
+    </p:ext>
+  </p:extLst>
 </p:presentation>
 </file>
 
@@ -239,7 +245,7 @@
           <a:p>
             <a:fld id="{93AD4F55-0731-42D7-9E4E-9523474B5592}" type="datetimeFigureOut">
               <a:rPr lang="en-US" smtClean="0"/>
-              <a:t>3/8/2015</a:t>
+              <a:t>4/14/2015</a:t>
             </a:fld>
             <a:endParaRPr lang="en-US"/>
           </a:p>
@@ -409,7 +415,7 @@
           <a:p>
             <a:fld id="{93AD4F55-0731-42D7-9E4E-9523474B5592}" type="datetimeFigureOut">
               <a:rPr lang="en-US" smtClean="0"/>
-              <a:t>3/8/2015</a:t>
+              <a:t>4/14/2015</a:t>
             </a:fld>
             <a:endParaRPr lang="en-US"/>
           </a:p>
@@ -589,7 +595,7 @@
           <a:p>
             <a:fld id="{93AD4F55-0731-42D7-9E4E-9523474B5592}" type="datetimeFigureOut">
               <a:rPr lang="en-US" smtClean="0"/>
-              <a:t>3/8/2015</a:t>
+              <a:t>4/14/2015</a:t>
             </a:fld>
             <a:endParaRPr lang="en-US"/>
           </a:p>
@@ -759,7 +765,7 @@
           <a:p>
             <a:fld id="{93AD4F55-0731-42D7-9E4E-9523474B5592}" type="datetimeFigureOut">
               <a:rPr lang="en-US" smtClean="0"/>
-              <a:t>3/8/2015</a:t>
+              <a:t>4/14/2015</a:t>
             </a:fld>
             <a:endParaRPr lang="en-US"/>
           </a:p>
@@ -1005,7 +1011,7 @@
           <a:p>
             <a:fld id="{93AD4F55-0731-42D7-9E4E-9523474B5592}" type="datetimeFigureOut">
               <a:rPr lang="en-US" smtClean="0"/>
-              <a:t>3/8/2015</a:t>
+              <a:t>4/14/2015</a:t>
             </a:fld>
             <a:endParaRPr lang="en-US"/>
           </a:p>
@@ -1237,7 +1243,7 @@
           <a:p>
             <a:fld id="{93AD4F55-0731-42D7-9E4E-9523474B5592}" type="datetimeFigureOut">
               <a:rPr lang="en-US" smtClean="0"/>
-              <a:t>3/8/2015</a:t>
+              <a:t>4/14/2015</a:t>
             </a:fld>
             <a:endParaRPr lang="en-US"/>
           </a:p>
@@ -1604,7 +1610,7 @@
           <a:p>
             <a:fld id="{93AD4F55-0731-42D7-9E4E-9523474B5592}" type="datetimeFigureOut">
               <a:rPr lang="en-US" smtClean="0"/>
-              <a:t>3/8/2015</a:t>
+              <a:t>4/14/2015</a:t>
             </a:fld>
             <a:endParaRPr lang="en-US"/>
           </a:p>
@@ -1722,7 +1728,7 @@
           <a:p>
             <a:fld id="{93AD4F55-0731-42D7-9E4E-9523474B5592}" type="datetimeFigureOut">
               <a:rPr lang="en-US" smtClean="0"/>
-              <a:t>3/8/2015</a:t>
+              <a:t>4/14/2015</a:t>
             </a:fld>
             <a:endParaRPr lang="en-US"/>
           </a:p>
@@ -1817,7 +1823,7 @@
           <a:p>
             <a:fld id="{93AD4F55-0731-42D7-9E4E-9523474B5592}" type="datetimeFigureOut">
               <a:rPr lang="en-US" smtClean="0"/>
-              <a:t>3/8/2015</a:t>
+              <a:t>4/14/2015</a:t>
             </a:fld>
             <a:endParaRPr lang="en-US"/>
           </a:p>
@@ -2094,7 +2100,7 @@
           <a:p>
             <a:fld id="{93AD4F55-0731-42D7-9E4E-9523474B5592}" type="datetimeFigureOut">
               <a:rPr lang="en-US" smtClean="0"/>
-              <a:t>3/8/2015</a:t>
+              <a:t>4/14/2015</a:t>
             </a:fld>
             <a:endParaRPr lang="en-US"/>
           </a:p>
@@ -2347,7 +2353,7 @@
           <a:p>
             <a:fld id="{93AD4F55-0731-42D7-9E4E-9523474B5592}" type="datetimeFigureOut">
               <a:rPr lang="en-US" smtClean="0"/>
-              <a:t>3/8/2015</a:t>
+              <a:t>4/14/2015</a:t>
             </a:fld>
             <a:endParaRPr lang="en-US"/>
           </a:p>
@@ -2560,7 +2566,7 @@
           <a:p>
             <a:fld id="{93AD4F55-0731-42D7-9E4E-9523474B5592}" type="datetimeFigureOut">
               <a:rPr lang="en-US" smtClean="0"/>
-              <a:t>3/8/2015</a:t>
+              <a:t>4/14/2015</a:t>
             </a:fld>
             <a:endParaRPr lang="en-US"/>
           </a:p>
@@ -4225,10 +4231,220 @@
           </a:prstGeom>
         </p:spPr>
       </p:pic>
+      <p:pic>
+        <p:nvPicPr>
+          <p:cNvPr id="2050" name="Picture 2" descr="http://raedevelopment.com/wp-content/uploads/2012/09/Career-sign-box.jpg"/>
+          <p:cNvPicPr>
+            <a:picLocks noChangeAspect="1" noChangeArrowheads="1"/>
+          </p:cNvPicPr>
+          <p:nvPr/>
+        </p:nvPicPr>
+        <p:blipFill rotWithShape="1">
+          <a:blip r:embed="rId7">
+            <a:extLst>
+              <a:ext uri="{28A0092B-C50C-407E-A947-70E740481C1C}">
+                <a14:useLocalDpi xmlns:a14="http://schemas.microsoft.com/office/drawing/2010/main" val="0"/>
+              </a:ext>
+            </a:extLst>
+          </a:blip>
+          <a:srcRect b="11365"/>
+          <a:stretch/>
+        </p:blipFill>
+        <p:spPr bwMode="auto">
+          <a:xfrm>
+            <a:off x="14049157" y="-3211520"/>
+            <a:ext cx="7312243" cy="5486400"/>
+          </a:xfrm>
+          <a:prstGeom prst="rect">
+            <a:avLst/>
+          </a:prstGeom>
+          <a:noFill/>
+          <a:extLst>
+            <a:ext uri="{909E8E84-426E-40DD-AFC4-6F175D3DCCD1}">
+              <a14:hiddenFill xmlns:a14="http://schemas.microsoft.com/office/drawing/2010/main">
+                <a:solidFill>
+                  <a:srgbClr val="FFFFFF"/>
+                </a:solidFill>
+              </a14:hiddenFill>
+            </a:ext>
+          </a:extLst>
+        </p:spPr>
+      </p:pic>
     </p:spTree>
     <p:extLst>
       <p:ext uri="{BB962C8B-B14F-4D97-AF65-F5344CB8AC3E}">
         <p14:creationId xmlns:p14="http://schemas.microsoft.com/office/powerpoint/2010/main" val="2223644034"/>
+      </p:ext>
+    </p:extLst>
+  </p:cSld>
+  <p:clrMapOvr>
+    <a:masterClrMapping/>
+  </p:clrMapOvr>
+</p:sld>
+</file>
+
+<file path=ppt/slides/slide3.xml><?xml version="1.0" encoding="utf-8"?>
+<p:sld xmlns:a="http://schemas.openxmlformats.org/drawingml/2006/main" xmlns:r="http://schemas.openxmlformats.org/officeDocument/2006/relationships" xmlns:p="http://schemas.openxmlformats.org/presentationml/2006/main">
+  <p:cSld>
+    <p:spTree>
+      <p:nvGrpSpPr>
+        <p:cNvPr id="1" name=""/>
+        <p:cNvGrpSpPr/>
+        <p:nvPr/>
+      </p:nvGrpSpPr>
+      <p:grpSpPr>
+        <a:xfrm>
+          <a:off x="0" y="0"/>
+          <a:ext cx="0" cy="0"/>
+          <a:chOff x="0" y="0"/>
+          <a:chExt cx="0" cy="0"/>
+        </a:xfrm>
+      </p:grpSpPr>
+      <p:pic>
+        <p:nvPicPr>
+          <p:cNvPr id="1026" name="Picture 2" descr="Bread Maker Bread maker in need"/>
+          <p:cNvPicPr>
+            <a:picLocks noChangeAspect="1" noChangeArrowheads="1"/>
+          </p:cNvPicPr>
+          <p:nvPr/>
+        </p:nvPicPr>
+        <p:blipFill rotWithShape="1">
+          <a:blip r:embed="rId2">
+            <a:extLst>
+              <a:ext uri="{28A0092B-C50C-407E-A947-70E740481C1C}">
+                <a14:useLocalDpi xmlns:a14="http://schemas.microsoft.com/office/drawing/2010/main" val="0"/>
+              </a:ext>
+            </a:extLst>
+          </a:blip>
+          <a:srcRect t="16695" b="6548"/>
+          <a:stretch/>
+        </p:blipFill>
+        <p:spPr bwMode="auto">
+          <a:xfrm>
+            <a:off x="-511316" y="469901"/>
+            <a:ext cx="3657600" cy="2740046"/>
+          </a:xfrm>
+          <a:prstGeom prst="rect">
+            <a:avLst/>
+          </a:prstGeom>
+          <a:noFill/>
+          <a:extLst>
+            <a:ext uri="{909E8E84-426E-40DD-AFC4-6F175D3DCCD1}">
+              <a14:hiddenFill xmlns:a14="http://schemas.microsoft.com/office/drawing/2010/main">
+                <a:solidFill>
+                  <a:srgbClr val="FFFFFF"/>
+                </a:solidFill>
+              </a14:hiddenFill>
+            </a:ext>
+          </a:extLst>
+        </p:spPr>
+      </p:pic>
+      <p:pic>
+        <p:nvPicPr>
+          <p:cNvPr id="1028" name="Picture 4" descr="http://www.sushilinks.com/sushi-magic-sushi-maker/box_cover.jpg"/>
+          <p:cNvPicPr>
+            <a:picLocks noChangeAspect="1" noChangeArrowheads="1"/>
+          </p:cNvPicPr>
+          <p:nvPr/>
+        </p:nvPicPr>
+        <p:blipFill rotWithShape="1">
+          <a:blip r:embed="rId3">
+            <a:extLst>
+              <a:ext uri="{28A0092B-C50C-407E-A947-70E740481C1C}">
+                <a14:useLocalDpi xmlns:a14="http://schemas.microsoft.com/office/drawing/2010/main" val="0"/>
+              </a:ext>
+            </a:extLst>
+          </a:blip>
+          <a:srcRect l="1" r="20796"/>
+          <a:stretch/>
+        </p:blipFill>
+        <p:spPr bwMode="auto">
+          <a:xfrm>
+            <a:off x="4219574" y="469901"/>
+            <a:ext cx="3654425" cy="2743200"/>
+          </a:xfrm>
+          <a:prstGeom prst="rect">
+            <a:avLst/>
+          </a:prstGeom>
+          <a:noFill/>
+          <a:extLst>
+            <a:ext uri="{909E8E84-426E-40DD-AFC4-6F175D3DCCD1}">
+              <a14:hiddenFill xmlns:a14="http://schemas.microsoft.com/office/drawing/2010/main">
+                <a:solidFill>
+                  <a:srgbClr val="FFFFFF"/>
+                </a:solidFill>
+              </a14:hiddenFill>
+            </a:ext>
+          </a:extLst>
+        </p:spPr>
+      </p:pic>
+      <p:pic>
+        <p:nvPicPr>
+          <p:cNvPr id="1030" name="Picture 6" descr="http://www.2014interiordesign.com/wp-content/uploads/2013/08/home-decoration-living-room-walls.jpg"/>
+          <p:cNvPicPr>
+            <a:picLocks noChangeAspect="1" noChangeArrowheads="1"/>
+          </p:cNvPicPr>
+          <p:nvPr/>
+        </p:nvPicPr>
+        <p:blipFill rotWithShape="1">
+          <a:blip r:embed="rId4">
+            <a:extLst>
+              <a:ext uri="{28A0092B-C50C-407E-A947-70E740481C1C}">
+                <a14:useLocalDpi xmlns:a14="http://schemas.microsoft.com/office/drawing/2010/main" val="0"/>
+              </a:ext>
+            </a:extLst>
+          </a:blip>
+          <a:srcRect l="38082" t="32013" r="7003" b="13133"/>
+          <a:stretch/>
+        </p:blipFill>
+        <p:spPr bwMode="auto">
+          <a:xfrm>
+            <a:off x="6045199" y="3022599"/>
+            <a:ext cx="3657601" cy="2743200"/>
+          </a:xfrm>
+          <a:prstGeom prst="rect">
+            <a:avLst/>
+          </a:prstGeom>
+          <a:noFill/>
+          <a:extLst>
+            <a:ext uri="{909E8E84-426E-40DD-AFC4-6F175D3DCCD1}">
+              <a14:hiddenFill xmlns:a14="http://schemas.microsoft.com/office/drawing/2010/main">
+                <a:solidFill>
+                  <a:srgbClr val="FFFFFF"/>
+                </a:solidFill>
+              </a14:hiddenFill>
+            </a:ext>
+          </a:extLst>
+        </p:spPr>
+      </p:pic>
+      <p:pic>
+        <p:nvPicPr>
+          <p:cNvPr id="5" name="Picture 4"/>
+          <p:cNvPicPr>
+            <a:picLocks noChangeAspect="1"/>
+          </p:cNvPicPr>
+          <p:nvPr/>
+        </p:nvPicPr>
+        <p:blipFill>
+          <a:blip r:embed="rId5"/>
+          <a:stretch>
+            <a:fillRect/>
+          </a:stretch>
+        </p:blipFill>
+        <p:spPr>
+          <a:xfrm>
+            <a:off x="1028541" y="3632081"/>
+            <a:ext cx="3657917" cy="2743438"/>
+          </a:xfrm>
+          <a:prstGeom prst="rect">
+            <a:avLst/>
+          </a:prstGeom>
+        </p:spPr>
+      </p:pic>
+    </p:spTree>
+    <p:extLst>
+      <p:ext uri="{BB962C8B-B14F-4D97-AF65-F5344CB8AC3E}">
+        <p14:creationId xmlns:p14="http://schemas.microsoft.com/office/powerpoint/2010/main" val="2401689000"/>
       </p:ext>
     </p:extLst>
   </p:cSld>

</xml_diff>